<commit_message>
Edited presentation slide, and report
</commit_message>
<xml_diff>
--- a/source/MySEProject/Documentation/Improve UnitTests for Temporal Memory Algorithm.pptx
+++ b/source/MySEProject/Documentation/Improve UnitTests for Temporal Memory Algorithm.pptx
@@ -5,7 +5,7 @@
     <p:sldMasterId id="2147483648" r:id="rId4"/>
   </p:sldMasterIdLst>
   <p:notesMasterIdLst>
-    <p:notesMasterId r:id="rId15"/>
+    <p:notesMasterId r:id="rId14"/>
   </p:notesMasterIdLst>
   <p:sldIdLst>
     <p:sldId id="256" r:id="rId5"/>
@@ -15,9 +15,8 @@
     <p:sldId id="277" r:id="rId9"/>
     <p:sldId id="278" r:id="rId10"/>
     <p:sldId id="279" r:id="rId11"/>
-    <p:sldId id="280" r:id="rId12"/>
-    <p:sldId id="273" r:id="rId13"/>
-    <p:sldId id="275" r:id="rId14"/>
+    <p:sldId id="273" r:id="rId12"/>
+    <p:sldId id="275" r:id="rId13"/>
   </p:sldIdLst>
   <p:sldSz cx="12192000" cy="6858000"/>
   <p:notesSz cx="6858000" cy="9144000"/>
@@ -218,7 +217,7 @@
           <a:p>
             <a:fld id="{7487ADD9-2083-264C-A652-8D52D02F7E72}" type="datetimeFigureOut">
               <a:rPr lang="en-US" smtClean="0"/>
-              <a:t>3/28/2023</a:t>
+              <a:t>3/29/2023</a:t>
             </a:fld>
             <a:endParaRPr lang="en-US" dirty="0"/>
           </a:p>
@@ -1875,7 +1874,7 @@
             <a:fld id="{5F02DCD1-2C6B-F948-9F72-3BB0CF3D512E}" type="datetime1">
               <a:rPr lang="en-US" smtClean="0"/>
               <a:pPr/>
-              <a:t>3/28/2023</a:t>
+              <a:t>3/29/2023</a:t>
             </a:fld>
             <a:endParaRPr lang="en-US" dirty="0"/>
           </a:p>
@@ -2760,7 +2759,7 @@
             <a:fld id="{C1583C39-01BF-7F43-854C-FBB4E9AB6B0C}" type="datetime1">
               <a:rPr lang="en-US" smtClean="0"/>
               <a:pPr/>
-              <a:t>3/28/2023</a:t>
+              <a:t>3/29/2023</a:t>
             </a:fld>
             <a:endParaRPr lang="en-US" dirty="0"/>
           </a:p>
@@ -3937,7 +3936,7 @@
             <a:fld id="{4B103E64-1627-9140-8127-1849FED275E1}" type="datetime1">
               <a:rPr lang="en-US" smtClean="0"/>
               <a:pPr/>
-              <a:t>3/28/2023</a:t>
+              <a:t>3/29/2023</a:t>
             </a:fld>
             <a:endParaRPr lang="en-US" dirty="0"/>
           </a:p>
@@ -6017,7 +6016,7 @@
             <a:fld id="{DD9C8446-696E-6942-B6C8-CC9CAD0B34E0}" type="datetime1">
               <a:rPr lang="en-US" smtClean="0"/>
               <a:pPr/>
-              <a:t>3/28/2023</a:t>
+              <a:t>3/29/2023</a:t>
             </a:fld>
             <a:endParaRPr lang="en-US" dirty="0"/>
           </a:p>
@@ -6735,7 +6734,7 @@
             <a:fld id="{F5592931-05C6-8543-8B6E-A8BD29BD5C2B}" type="datetime1">
               <a:rPr lang="en-US" smtClean="0"/>
               <a:pPr/>
-              <a:t>3/28/2023</a:t>
+              <a:t>3/29/2023</a:t>
             </a:fld>
             <a:endParaRPr lang="en-US" dirty="0"/>
           </a:p>
@@ -7963,7 +7962,7 @@
             <a:fld id="{7E7AB22C-8B7E-9B4A-8C65-396C3C874D86}" type="datetime1">
               <a:rPr lang="en-US" smtClean="0"/>
               <a:pPr/>
-              <a:t>3/28/2023</a:t>
+              <a:t>3/29/2023</a:t>
             </a:fld>
             <a:endParaRPr lang="en-US" dirty="0"/>
           </a:p>
@@ -8555,7 +8554,7 @@
             <a:fld id="{8CE9AC2A-20AD-8C48-B5EB-B5322BDBCDEE}" type="datetime1">
               <a:rPr lang="en-US" smtClean="0"/>
               <a:pPr/>
-              <a:t>3/28/2023</a:t>
+              <a:t>3/29/2023</a:t>
             </a:fld>
             <a:endParaRPr lang="en-US" dirty="0"/>
           </a:p>
@@ -9028,7 +9027,7 @@
             <a:fld id="{4CF75428-5BE0-934D-BB71-675F8E23A386}" type="datetime1">
               <a:rPr lang="en-US" smtClean="0"/>
               <a:pPr/>
-              <a:t>3/28/2023</a:t>
+              <a:t>3/29/2023</a:t>
             </a:fld>
             <a:endParaRPr lang="en-US" dirty="0"/>
           </a:p>
@@ -9878,7 +9877,7 @@
             <a:fld id="{9A85C5CA-AE29-AB4C-8F85-0373C72001D8}" type="datetime1">
               <a:rPr lang="en-US" smtClean="0"/>
               <a:pPr/>
-              <a:t>3/28/2023</a:t>
+              <a:t>3/29/2023</a:t>
             </a:fld>
             <a:endParaRPr lang="en-US" dirty="0"/>
           </a:p>
@@ -12103,7 +12102,7 @@
             <a:fld id="{75594855-01E8-5A4B-B2B8-E2ECEF879100}" type="datetime1">
               <a:rPr lang="en-US" smtClean="0"/>
               <a:pPr/>
-              <a:t>3/28/2023</a:t>
+              <a:t>3/29/2023</a:t>
             </a:fld>
             <a:endParaRPr lang="en-US" dirty="0"/>
           </a:p>
@@ -12372,7 +12371,7 @@
             <a:fld id="{B562DF68-3089-814D-8A14-C651FE91885E}" type="datetime1">
               <a:rPr lang="en-US" smtClean="0"/>
               <a:pPr/>
-              <a:t>3/28/2023</a:t>
+              <a:t>3/29/2023</a:t>
             </a:fld>
             <a:endParaRPr lang="en-US" dirty="0"/>
           </a:p>
@@ -12910,28 +12909,27 @@
           <a:bodyPr/>
           <a:lstStyle/>
           <a:p>
-            <a:pPr algn="l"/>
             <a:r>
               <a:rPr lang="en-US" sz="5400" b="1" i="0" dirty="0">
                 <a:effectLst/>
-                <a:latin typeface="Arabic Typesetting" panose="020B0604020202020204" pitchFamily="66" charset="-78"/>
-                <a:cs typeface="Arabic Typesetting" panose="020B0604020202020204" pitchFamily="66" charset="-78"/>
+                <a:latin typeface="Times New Roman" panose="02020603050405020304" pitchFamily="18" charset="0"/>
+                <a:cs typeface="Times New Roman" panose="02020603050405020304" pitchFamily="18" charset="0"/>
               </a:rPr>
               <a:t>Improve </a:t>
             </a:r>
             <a:r>
               <a:rPr lang="en-US" sz="5400" b="1" i="0" dirty="0" err="1">
                 <a:effectLst/>
-                <a:latin typeface="Arabic Typesetting" panose="020B0604020202020204" pitchFamily="66" charset="-78"/>
-                <a:cs typeface="Arabic Typesetting" panose="020B0604020202020204" pitchFamily="66" charset="-78"/>
+                <a:latin typeface="Times New Roman" panose="02020603050405020304" pitchFamily="18" charset="0"/>
+                <a:cs typeface="Times New Roman" panose="02020603050405020304" pitchFamily="18" charset="0"/>
               </a:rPr>
               <a:t>UnitTests</a:t>
             </a:r>
             <a:r>
               <a:rPr lang="en-US" sz="5400" b="1" i="0" dirty="0">
                 <a:effectLst/>
-                <a:latin typeface="Arabic Typesetting" panose="020B0604020202020204" pitchFamily="66" charset="-78"/>
-                <a:cs typeface="Arabic Typesetting" panose="020B0604020202020204" pitchFamily="66" charset="-78"/>
+                <a:latin typeface="Times New Roman" panose="02020603050405020304" pitchFamily="18" charset="0"/>
+                <a:cs typeface="Times New Roman" panose="02020603050405020304" pitchFamily="18" charset="0"/>
               </a:rPr>
               <a:t> for Temporal Memory Algorithm</a:t>
             </a:r>
@@ -12971,16 +12969,16 @@
             </a:pPr>
             <a:r>
               <a:rPr lang="en-US" sz="2000" dirty="0">
-                <a:latin typeface="Arial" panose="020B0604020202020204" pitchFamily="34" charset="0"/>
-                <a:cs typeface="Arial" panose="020B0604020202020204" pitchFamily="34" charset="0"/>
+                <a:latin typeface="Times New Roman" panose="02020603050405020304" pitchFamily="18" charset="0"/>
+                <a:cs typeface="Times New Roman" panose="02020603050405020304" pitchFamily="18" charset="0"/>
               </a:rPr>
               <a:t>Group name:</a:t>
             </a:r>
             <a:r>
               <a:rPr lang="en-ID" sz="2000" i="0" dirty="0">
                 <a:effectLst/>
-                <a:latin typeface="Arial" panose="020B0604020202020204" pitchFamily="34" charset="0"/>
-                <a:cs typeface="Arial" panose="020B0604020202020204" pitchFamily="34" charset="0"/>
+                <a:latin typeface="Times New Roman" panose="02020603050405020304" pitchFamily="18" charset="0"/>
+                <a:cs typeface="Times New Roman" panose="02020603050405020304" pitchFamily="18" charset="0"/>
               </a:rPr>
               <a:t>Variable-I</a:t>
             </a:r>
@@ -12994,52 +12992,66 @@
             <a:r>
               <a:rPr lang="en-ID" sz="2000" i="0" u="sng" dirty="0">
                 <a:effectLst/>
-                <a:latin typeface="Arial" panose="020B0604020202020204" pitchFamily="34" charset="0"/>
-                <a:cs typeface="Arial" panose="020B0604020202020204" pitchFamily="34" charset="0"/>
+                <a:latin typeface="Times New Roman" panose="02020603050405020304" pitchFamily="18" charset="0"/>
+                <a:cs typeface="Times New Roman" panose="02020603050405020304" pitchFamily="18" charset="0"/>
               </a:rPr>
               <a:t>Group members:</a:t>
             </a:r>
           </a:p>
           <a:p>
             <a:r>
-              <a:rPr lang="en-US" sz="1800" dirty="0"/>
+              <a:rPr lang="en-US" sz="1800" dirty="0">
+                <a:latin typeface="Times New Roman" panose="02020603050405020304" pitchFamily="18" charset="0"/>
+                <a:cs typeface="Times New Roman" panose="02020603050405020304" pitchFamily="18" charset="0"/>
+              </a:rPr>
               <a:t>Syed </a:t>
             </a:r>
             <a:r>
-              <a:rPr lang="en-US" sz="1800" dirty="0" err="1"/>
+              <a:rPr lang="en-US" sz="1800" dirty="0" err="1">
+                <a:latin typeface="Times New Roman" panose="02020603050405020304" pitchFamily="18" charset="0"/>
+                <a:cs typeface="Times New Roman" panose="02020603050405020304" pitchFamily="18" charset="0"/>
+              </a:rPr>
               <a:t>Mostain</a:t>
             </a:r>
             <a:r>
-              <a:rPr lang="en-US" sz="1800" dirty="0"/>
+              <a:rPr lang="en-US" sz="1800" dirty="0">
+                <a:latin typeface="Times New Roman" panose="02020603050405020304" pitchFamily="18" charset="0"/>
+                <a:cs typeface="Times New Roman" panose="02020603050405020304" pitchFamily="18" charset="0"/>
+              </a:rPr>
               <a:t> Ahmed     (1390214)</a:t>
             </a:r>
           </a:p>
           <a:p>
             <a:r>
-              <a:rPr lang="en-US" sz="1800" dirty="0"/>
+              <a:rPr lang="en-US" sz="1800" dirty="0">
+                <a:latin typeface="Times New Roman" panose="02020603050405020304" pitchFamily="18" charset="0"/>
+                <a:cs typeface="Times New Roman" panose="02020603050405020304" pitchFamily="18" charset="0"/>
+              </a:rPr>
               <a:t>Farjana </a:t>
             </a:r>
             <a:r>
-              <a:rPr lang="en-US" sz="1800" dirty="0" err="1"/>
+              <a:rPr lang="en-US" sz="1800" dirty="0" err="1">
+                <a:latin typeface="Times New Roman" panose="02020603050405020304" pitchFamily="18" charset="0"/>
+                <a:cs typeface="Times New Roman" panose="02020603050405020304" pitchFamily="18" charset="0"/>
+              </a:rPr>
               <a:t>Akter</a:t>
             </a:r>
             <a:r>
-              <a:rPr lang="en-US" sz="1800" dirty="0"/>
+              <a:rPr lang="en-US" sz="1800" dirty="0">
+                <a:latin typeface="Times New Roman" panose="02020603050405020304" pitchFamily="18" charset="0"/>
+                <a:cs typeface="Times New Roman" panose="02020603050405020304" pitchFamily="18" charset="0"/>
+              </a:rPr>
               <a:t>                 (1344037)</a:t>
             </a:r>
           </a:p>
           <a:p>
             <a:r>
-              <a:rPr lang="en-US" sz="1800" dirty="0"/>
+              <a:rPr lang="en-US" sz="1800" dirty="0">
+                <a:latin typeface="Times New Roman" panose="02020603050405020304" pitchFamily="18" charset="0"/>
+                <a:cs typeface="Times New Roman" panose="02020603050405020304" pitchFamily="18" charset="0"/>
+              </a:rPr>
               <a:t>Md. Shamsir Doha         (1344011)</a:t>
             </a:r>
-          </a:p>
-          <a:p>
-            <a:r>
-              <a:rPr lang="bn-IN" sz="1800" dirty="0"/>
-              <a:t>ম</a:t>
-            </a:r>
-            <a:endParaRPr lang="en-US" sz="1800" dirty="0"/>
           </a:p>
           <a:p>
             <a:endParaRPr lang="en-US" dirty="0"/>
@@ -13060,101 +13072,6 @@
     <p:extLst>
       <p:ext uri="{BB962C8B-B14F-4D97-AF65-F5344CB8AC3E}">
         <p14:creationId xmlns:p14="http://schemas.microsoft.com/office/powerpoint/2010/main" val="2259308896"/>
-      </p:ext>
-    </p:extLst>
-  </p:cSld>
-  <p:clrMapOvr>
-    <a:masterClrMapping/>
-  </p:clrMapOvr>
-</p:sld>
-</file>
-
-<file path=ppt/slides/slide10.xml><?xml version="1.0" encoding="utf-8"?>
-<p:sld xmlns:a="http://schemas.openxmlformats.org/drawingml/2006/main" xmlns:r="http://schemas.openxmlformats.org/officeDocument/2006/relationships" xmlns:p="http://schemas.openxmlformats.org/presentationml/2006/main">
-  <p:cSld>
-    <p:spTree>
-      <p:nvGrpSpPr>
-        <p:cNvPr id="1" name=""/>
-        <p:cNvGrpSpPr/>
-        <p:nvPr/>
-      </p:nvGrpSpPr>
-      <p:grpSpPr>
-        <a:xfrm>
-          <a:off x="0" y="0"/>
-          <a:ext cx="0" cy="0"/>
-          <a:chOff x="0" y="0"/>
-          <a:chExt cx="0" cy="0"/>
-        </a:xfrm>
-      </p:grpSpPr>
-      <p:sp>
-        <p:nvSpPr>
-          <p:cNvPr id="2" name="Title 1">
-            <a:extLst>
-              <a:ext uri="{FF2B5EF4-FFF2-40B4-BE49-F238E27FC236}">
-                <a16:creationId xmlns:a16="http://schemas.microsoft.com/office/drawing/2014/main" id="{69FAE308-3076-43DB-B834-DA0B0AE19AF9}"/>
-              </a:ext>
-            </a:extLst>
-          </p:cNvPr>
-          <p:cNvSpPr>
-            <a:spLocks noGrp="1"/>
-          </p:cNvSpPr>
-          <p:nvPr>
-            <p:ph type="ctrTitle"/>
-          </p:nvPr>
-        </p:nvSpPr>
-        <p:spPr>
-          <a:xfrm>
-            <a:off x="1167494" y="1122363"/>
-            <a:ext cx="6220278" cy="2387600"/>
-          </a:xfrm>
-        </p:spPr>
-        <p:txBody>
-          <a:bodyPr/>
-          <a:lstStyle/>
-          <a:p>
-            <a:r>
-              <a:rPr lang="en-US" dirty="0"/>
-              <a:t>Thank you</a:t>
-            </a:r>
-          </a:p>
-        </p:txBody>
-      </p:sp>
-      <p:sp>
-        <p:nvSpPr>
-          <p:cNvPr id="3" name="Content Placeholder 2">
-            <a:extLst>
-              <a:ext uri="{FF2B5EF4-FFF2-40B4-BE49-F238E27FC236}">
-                <a16:creationId xmlns:a16="http://schemas.microsoft.com/office/drawing/2014/main" id="{BABC2CE0-8806-4B2A-A10A-32984D317434}"/>
-              </a:ext>
-            </a:extLst>
-          </p:cNvPr>
-          <p:cNvSpPr>
-            <a:spLocks noGrp="1"/>
-          </p:cNvSpPr>
-          <p:nvPr>
-            <p:ph type="subTitle" idx="1"/>
-          </p:nvPr>
-        </p:nvSpPr>
-        <p:spPr>
-          <a:xfrm>
-            <a:off x="1167493" y="3602038"/>
-            <a:ext cx="6220277" cy="2247219"/>
-          </a:xfrm>
-        </p:spPr>
-        <p:txBody>
-          <a:bodyPr>
-            <a:normAutofit/>
-          </a:bodyPr>
-          <a:lstStyle/>
-          <a:p>
-            <a:endParaRPr lang="en-US" dirty="0"/>
-          </a:p>
-        </p:txBody>
-      </p:sp>
-    </p:spTree>
-    <p:extLst>
-      <p:ext uri="{BB962C8B-B14F-4D97-AF65-F5344CB8AC3E}">
-        <p14:creationId xmlns:p14="http://schemas.microsoft.com/office/powerpoint/2010/main" val="926184573"/>
       </p:ext>
     </p:extLst>
   </p:cSld>
@@ -13208,7 +13125,10 @@
           <a:lstStyle/>
           <a:p>
             <a:r>
-              <a:rPr lang="en-US" dirty="0"/>
+              <a:rPr lang="en-US" dirty="0">
+                <a:latin typeface="Times New Roman" panose="02020603050405020304" pitchFamily="18" charset="0"/>
+                <a:cs typeface="Times New Roman" panose="02020603050405020304" pitchFamily="18" charset="0"/>
+              </a:rPr>
               <a:t>Agenda</a:t>
             </a:r>
           </a:p>
@@ -13243,37 +13163,46 @@
           <a:lstStyle/>
           <a:p>
             <a:r>
-              <a:rPr lang="en-US" dirty="0"/>
+              <a:rPr lang="en-US" dirty="0">
+                <a:latin typeface="Times New Roman" panose="02020603050405020304" pitchFamily="18" charset="0"/>
+                <a:cs typeface="Times New Roman" panose="02020603050405020304" pitchFamily="18" charset="0"/>
+              </a:rPr>
               <a:t>Introduction</a:t>
             </a:r>
           </a:p>
           <a:p>
             <a:r>
-              <a:rPr lang="en-US" dirty="0"/>
+              <a:rPr lang="en-US" dirty="0">
+                <a:latin typeface="Times New Roman" panose="02020603050405020304" pitchFamily="18" charset="0"/>
+                <a:cs typeface="Times New Roman" panose="02020603050405020304" pitchFamily="18" charset="0"/>
+              </a:rPr>
               <a:t>Goals of your project</a:t>
             </a:r>
           </a:p>
           <a:p>
             <a:r>
-              <a:rPr lang="en-US" dirty="0"/>
+              <a:rPr lang="en-US" dirty="0">
+                <a:latin typeface="Times New Roman" panose="02020603050405020304" pitchFamily="18" charset="0"/>
+                <a:cs typeface="Times New Roman" panose="02020603050405020304" pitchFamily="18" charset="0"/>
+              </a:rPr>
               <a:t>Implementation </a:t>
             </a:r>
           </a:p>
           <a:p>
             <a:r>
-              <a:rPr lang="en-US" dirty="0"/>
+              <a:rPr lang="en-US" dirty="0">
+                <a:latin typeface="Times New Roman" panose="02020603050405020304" pitchFamily="18" charset="0"/>
+                <a:cs typeface="Times New Roman" panose="02020603050405020304" pitchFamily="18" charset="0"/>
+              </a:rPr>
               <a:t>Result</a:t>
             </a:r>
           </a:p>
           <a:p>
             <a:r>
-              <a:rPr lang="en-US" dirty="0"/>
-              <a:t>limitation</a:t>
-            </a:r>
-          </a:p>
-          <a:p>
-            <a:r>
-              <a:rPr lang="en-US" dirty="0"/>
+              <a:rPr lang="en-US" dirty="0">
+                <a:latin typeface="Times New Roman" panose="02020603050405020304" pitchFamily="18" charset="0"/>
+                <a:cs typeface="Times New Roman" panose="02020603050405020304" pitchFamily="18" charset="0"/>
+              </a:rPr>
               <a:t>conclusion </a:t>
             </a:r>
           </a:p>
@@ -13311,7 +13240,7 @@
             <a:fld id="{495D8227-9DE4-4D42-8C1B-E10C828BC634}" type="datetime1">
               <a:rPr lang="en-US" smtClean="0"/>
               <a:pPr/>
-              <a:t>3/28/2023</a:t>
+              <a:t>3/29/2023</a:t>
             </a:fld>
             <a:endParaRPr lang="en-US" dirty="0"/>
           </a:p>
@@ -13455,7 +13384,10 @@
           <a:lstStyle/>
           <a:p>
             <a:r>
-              <a:rPr lang="en-US" dirty="0"/>
+              <a:rPr lang="en-US" dirty="0">
+                <a:latin typeface="Times New Roman" panose="02020603050405020304" pitchFamily="18" charset="0"/>
+                <a:cs typeface="Times New Roman" panose="02020603050405020304" pitchFamily="18" charset="0"/>
+              </a:rPr>
               <a:t>Introduction</a:t>
             </a:r>
           </a:p>
@@ -13503,9 +13435,6 @@
               <a:ea typeface="SimSun" panose="02010600030101010101" pitchFamily="2" charset="-122"/>
             </a:endParaRPr>
           </a:p>
-          <a:p>
-            <a:endParaRPr lang="en-US" dirty="0"/>
-          </a:p>
         </p:txBody>
       </p:sp>
       <p:sp>
@@ -13537,7 +13466,7 @@
             <a:fld id="{E1707CF3-9BC4-A745-ACDA-A73543D800FE}" type="datetime1">
               <a:rPr lang="en-US" smtClean="0"/>
               <a:pPr/>
-              <a:t>3/28/2023</a:t>
+              <a:t>3/29/2023</a:t>
             </a:fld>
             <a:endParaRPr lang="en-US" dirty="0"/>
           </a:p>
@@ -13681,7 +13610,10 @@
           <a:lstStyle/>
           <a:p>
             <a:r>
-              <a:rPr lang="en-US" dirty="0"/>
+              <a:rPr lang="en-US" dirty="0">
+                <a:latin typeface="Times New Roman" panose="02020603050405020304" pitchFamily="18" charset="0"/>
+                <a:cs typeface="Times New Roman" panose="02020603050405020304" pitchFamily="18" charset="0"/>
+              </a:rPr>
               <a:t>Goals of your project</a:t>
             </a:r>
           </a:p>
@@ -13722,24 +13654,24 @@
             <a:r>
               <a:rPr lang="en-US" sz="2400" b="1" i="0" dirty="0">
                 <a:effectLst/>
-                <a:latin typeface="Arabic Typesetting" panose="020B0604020202020204" pitchFamily="66" charset="-78"/>
-                <a:cs typeface="Arabic Typesetting" panose="020B0604020202020204" pitchFamily="66" charset="-78"/>
+                <a:latin typeface="Times New Roman" panose="02020603050405020304" pitchFamily="18" charset="0"/>
+                <a:cs typeface="Times New Roman" panose="02020603050405020304" pitchFamily="18" charset="0"/>
               </a:rPr>
               <a:t>Improve </a:t>
             </a:r>
             <a:r>
               <a:rPr lang="en-US" sz="2400" b="1" i="0" dirty="0" err="1">
                 <a:effectLst/>
-                <a:latin typeface="Arabic Typesetting" panose="020B0604020202020204" pitchFamily="66" charset="-78"/>
-                <a:cs typeface="Arabic Typesetting" panose="020B0604020202020204" pitchFamily="66" charset="-78"/>
+                <a:latin typeface="Times New Roman" panose="02020603050405020304" pitchFamily="18" charset="0"/>
+                <a:cs typeface="Times New Roman" panose="02020603050405020304" pitchFamily="18" charset="0"/>
               </a:rPr>
               <a:t>UnitTests</a:t>
             </a:r>
             <a:r>
               <a:rPr lang="en-US" sz="2400" b="1" i="0" dirty="0">
                 <a:effectLst/>
-                <a:latin typeface="Arabic Typesetting" panose="020B0604020202020204" pitchFamily="66" charset="-78"/>
-                <a:cs typeface="Arabic Typesetting" panose="020B0604020202020204" pitchFamily="66" charset="-78"/>
+                <a:latin typeface="Times New Roman" panose="02020603050405020304" pitchFamily="18" charset="0"/>
+                <a:cs typeface="Times New Roman" panose="02020603050405020304" pitchFamily="18" charset="0"/>
               </a:rPr>
               <a:t> for Temporal Memory Algorithm</a:t>
             </a:r>
@@ -13751,8 +13683,8 @@
             </a:pPr>
             <a:r>
               <a:rPr lang="en-US" b="1" dirty="0">
-                <a:latin typeface="Arabic Typesetting" panose="020B0604020202020204" pitchFamily="66" charset="-78"/>
-                <a:cs typeface="Arabic Typesetting" panose="020B0604020202020204" pitchFamily="66" charset="-78"/>
+                <a:latin typeface="Times New Roman" panose="02020603050405020304" pitchFamily="18" charset="0"/>
+                <a:cs typeface="Times New Roman" panose="02020603050405020304" pitchFamily="18" charset="0"/>
               </a:rPr>
               <a:t>Create some unique test case</a:t>
             </a:r>
@@ -13764,8 +13696,8 @@
             </a:pPr>
             <a:r>
               <a:rPr lang="en-US" b="1" dirty="0">
-                <a:latin typeface="Arabic Typesetting" panose="020B0604020202020204" pitchFamily="66" charset="-78"/>
-                <a:cs typeface="Arabic Typesetting" panose="020B0604020202020204" pitchFamily="66" charset="-78"/>
+                <a:latin typeface="Times New Roman" panose="02020603050405020304" pitchFamily="18" charset="0"/>
+                <a:cs typeface="Times New Roman" panose="02020603050405020304" pitchFamily="18" charset="0"/>
               </a:rPr>
               <a:t>Create test case using dataset.</a:t>
             </a:r>
@@ -13807,7 +13739,7 @@
             <a:fld id="{E1707CF3-9BC4-A745-ACDA-A73543D800FE}" type="datetime1">
               <a:rPr lang="en-US" smtClean="0"/>
               <a:pPr/>
-              <a:t>3/28/2023</a:t>
+              <a:t>3/29/2023</a:t>
             </a:fld>
             <a:endParaRPr lang="en-US" dirty="0"/>
           </a:p>
@@ -13947,22 +13879,58 @@
           </a:xfrm>
         </p:spPr>
         <p:txBody>
-          <a:bodyPr/>
+          <a:bodyPr anchor="b">
+            <a:normAutofit/>
+          </a:bodyPr>
           <a:lstStyle/>
           <a:p>
             <a:r>
-              <a:rPr lang="en-US" dirty="0"/>
+              <a:rPr lang="en-US" dirty="0">
+                <a:latin typeface="Times New Roman" panose="02020603050405020304" pitchFamily="18" charset="0"/>
+                <a:cs typeface="Times New Roman" panose="02020603050405020304" pitchFamily="18" charset="0"/>
+              </a:rPr>
               <a:t>Implementation</a:t>
             </a:r>
           </a:p>
         </p:txBody>
       </p:sp>
-      <p:sp>
-        <p:nvSpPr>
-          <p:cNvPr id="3" name="Content Placeholder 2">
-            <a:extLst>
-              <a:ext uri="{FF2B5EF4-FFF2-40B4-BE49-F238E27FC236}">
-                <a16:creationId xmlns:a16="http://schemas.microsoft.com/office/drawing/2014/main" id="{95B371F2-DBA5-415A-82C8-651F587B857A}"/>
+      <p:pic>
+        <p:nvPicPr>
+          <p:cNvPr id="10" name="Picture 9" descr="Diagram&#10;&#10;Description automatically generated">
+            <a:extLst>
+              <a:ext uri="{FF2B5EF4-FFF2-40B4-BE49-F238E27FC236}">
+                <a16:creationId xmlns:a16="http://schemas.microsoft.com/office/drawing/2014/main" id="{5D3F573E-F64A-2861-316C-6B744833C821}"/>
+              </a:ext>
+            </a:extLst>
+          </p:cNvPr>
+          <p:cNvPicPr>
+            <a:picLocks noChangeAspect="1"/>
+          </p:cNvPicPr>
+          <p:nvPr/>
+        </p:nvPicPr>
+        <p:blipFill>
+          <a:blip r:embed="rId2"/>
+          <a:stretch>
+            <a:fillRect/>
+          </a:stretch>
+        </p:blipFill>
+        <p:spPr>
+          <a:xfrm>
+            <a:off x="524795" y="1862015"/>
+            <a:ext cx="5000934" cy="4494335"/>
+          </a:xfrm>
+          <a:prstGeom prst="rect">
+            <a:avLst/>
+          </a:prstGeom>
+          <a:noFill/>
+        </p:spPr>
+      </p:pic>
+      <p:sp>
+        <p:nvSpPr>
+          <p:cNvPr id="4" name="Date Placeholder 3">
+            <a:extLst>
+              <a:ext uri="{FF2B5EF4-FFF2-40B4-BE49-F238E27FC236}">
+                <a16:creationId xmlns:a16="http://schemas.microsoft.com/office/drawing/2014/main" id="{DB056174-CBC5-7B48-9681-7DDAC423337E}"/>
               </a:ext>
             </a:extLst>
           </p:cNvPr>
@@ -13970,31 +13938,45 @@
             <a:spLocks noGrp="1"/>
           </p:cNvSpPr>
           <p:nvPr>
-            <p:ph type="body" idx="1"/>
+            <p:ph type="dt" sz="half" idx="2"/>
           </p:nvPr>
         </p:nvSpPr>
         <p:spPr>
           <a:xfrm>
-            <a:off x="160318" y="2274125"/>
-            <a:ext cx="10786358" cy="3815526"/>
-          </a:xfrm>
-        </p:spPr>
-        <p:txBody>
-          <a:bodyPr vert="horz" lIns="91440" tIns="45720" rIns="91440" bIns="45720" rtlCol="0" anchor="t">
+            <a:off x="381000" y="6356350"/>
+            <a:ext cx="2743200" cy="365125"/>
+          </a:xfrm>
+        </p:spPr>
+        <p:txBody>
+          <a:bodyPr anchor="ctr">
             <a:normAutofit/>
           </a:bodyPr>
           <a:lstStyle/>
           <a:p>
-            <a:endParaRPr lang="en-US" dirty="0"/>
-          </a:p>
-        </p:txBody>
-      </p:sp>
-      <p:sp>
-        <p:nvSpPr>
-          <p:cNvPr id="4" name="Date Placeholder 3">
-            <a:extLst>
-              <a:ext uri="{FF2B5EF4-FFF2-40B4-BE49-F238E27FC236}">
-                <a16:creationId xmlns:a16="http://schemas.microsoft.com/office/drawing/2014/main" id="{DB056174-CBC5-7B48-9681-7DDAC423337E}"/>
+            <a:pPr>
+              <a:spcAft>
+                <a:spcPts val="600"/>
+              </a:spcAft>
+            </a:pPr>
+            <a:fld id="{E1707CF3-9BC4-A745-ACDA-A73543D800FE}" type="datetime1">
+              <a:rPr lang="en-US" smtClean="0"/>
+              <a:pPr>
+                <a:spcAft>
+                  <a:spcPts val="600"/>
+                </a:spcAft>
+              </a:pPr>
+              <a:t>3/29/2023</a:t>
+            </a:fld>
+            <a:endParaRPr lang="en-US"/>
+          </a:p>
+        </p:txBody>
+      </p:sp>
+      <p:sp>
+        <p:nvSpPr>
+          <p:cNvPr id="5" name="Footer Placeholder 4">
+            <a:extLst>
+              <a:ext uri="{FF2B5EF4-FFF2-40B4-BE49-F238E27FC236}">
+                <a16:creationId xmlns:a16="http://schemas.microsoft.com/office/drawing/2014/main" id="{D593FA18-50D6-0344-B477-1D7C91CF4029}"/>
               </a:ext>
             </a:extLst>
           </p:cNvPr>
@@ -14002,34 +13984,48 @@
             <a:spLocks noGrp="1"/>
           </p:cNvSpPr>
           <p:nvPr>
-            <p:ph type="dt" sz="half" idx="10"/>
+            <p:ph type="ftr" sz="quarter" idx="3"/>
           </p:nvPr>
         </p:nvSpPr>
         <p:spPr>
           <a:xfrm>
-            <a:off x="381000" y="6356350"/>
-            <a:ext cx="2743200" cy="365125"/>
-          </a:xfrm>
-        </p:spPr>
-        <p:txBody>
-          <a:bodyPr/>
+            <a:off x="4038600" y="6356350"/>
+            <a:ext cx="4114800" cy="365125"/>
+          </a:xfrm>
+        </p:spPr>
+        <p:txBody>
+          <a:bodyPr anchor="ctr">
+            <a:normAutofit/>
+          </a:bodyPr>
           <a:lstStyle/>
           <a:p>
-            <a:fld id="{E1707CF3-9BC4-A745-ACDA-A73543D800FE}" type="datetime1">
-              <a:rPr lang="en-US" smtClean="0"/>
-              <a:pPr/>
-              <a:t>3/28/2023</a:t>
-            </a:fld>
-            <a:endParaRPr lang="en-US" dirty="0"/>
-          </a:p>
-        </p:txBody>
-      </p:sp>
-      <p:sp>
-        <p:nvSpPr>
-          <p:cNvPr id="5" name="Footer Placeholder 4">
-            <a:extLst>
-              <a:ext uri="{FF2B5EF4-FFF2-40B4-BE49-F238E27FC236}">
-                <a16:creationId xmlns:a16="http://schemas.microsoft.com/office/drawing/2014/main" id="{D593FA18-50D6-0344-B477-1D7C91CF4029}"/>
+            <a:pPr>
+              <a:spcAft>
+                <a:spcPts val="600"/>
+              </a:spcAft>
+            </a:pPr>
+            <a:r>
+              <a:rPr lang="en-US" b="1" i="0" err="1">
+                <a:effectLst/>
+              </a:rPr>
+              <a:t>UnitTests</a:t>
+            </a:r>
+            <a:r>
+              <a:rPr lang="en-US" b="1" i="0">
+                <a:effectLst/>
+              </a:rPr>
+              <a:t> for Temporal Memory Algorithm</a:t>
+            </a:r>
+            <a:endParaRPr lang="en-US"/>
+          </a:p>
+        </p:txBody>
+      </p:sp>
+      <p:sp>
+        <p:nvSpPr>
+          <p:cNvPr id="6" name="Slide Number Placeholder 5">
+            <a:extLst>
+              <a:ext uri="{FF2B5EF4-FFF2-40B4-BE49-F238E27FC236}">
+                <a16:creationId xmlns:a16="http://schemas.microsoft.com/office/drawing/2014/main" id="{134C72D2-EFDF-844A-8472-CB49A59B127B}"/>
               </a:ext>
             </a:extLst>
           </p:cNvPr>
@@ -14037,71 +14033,36 @@
             <a:spLocks noGrp="1"/>
           </p:cNvSpPr>
           <p:nvPr>
-            <p:ph type="ftr" sz="quarter" idx="11"/>
+            <p:ph type="sldNum" sz="quarter" idx="4"/>
           </p:nvPr>
         </p:nvSpPr>
         <p:spPr>
           <a:xfrm>
-            <a:off x="4038600" y="6356350"/>
-            <a:ext cx="4114800" cy="365125"/>
-          </a:xfrm>
-        </p:spPr>
-        <p:txBody>
-          <a:bodyPr/>
+            <a:off x="10153276" y="6356350"/>
+            <a:ext cx="1657723" cy="365125"/>
+          </a:xfrm>
+        </p:spPr>
+        <p:txBody>
+          <a:bodyPr anchor="ctr">
+            <a:normAutofit/>
+          </a:bodyPr>
           <a:lstStyle/>
           <a:p>
-            <a:r>
-              <a:rPr lang="en-US" sz="1200" b="1" i="0" dirty="0" err="1">
-                <a:effectLst/>
-                <a:latin typeface="Arabic Typesetting" panose="020B0604020202020204" pitchFamily="66" charset="-78"/>
-                <a:cs typeface="Arabic Typesetting" panose="020B0604020202020204" pitchFamily="66" charset="-78"/>
-              </a:rPr>
-              <a:t>UnitTests</a:t>
-            </a:r>
-            <a:r>
-              <a:rPr lang="en-US" sz="1200" b="1" i="0" dirty="0">
-                <a:effectLst/>
-                <a:latin typeface="Arabic Typesetting" panose="020B0604020202020204" pitchFamily="66" charset="-78"/>
-                <a:cs typeface="Arabic Typesetting" panose="020B0604020202020204" pitchFamily="66" charset="-78"/>
-              </a:rPr>
-              <a:t> for Temporal Memory Algorithm</a:t>
-            </a:r>
-            <a:endParaRPr lang="en-US" dirty="0"/>
-          </a:p>
-        </p:txBody>
-      </p:sp>
-      <p:sp>
-        <p:nvSpPr>
-          <p:cNvPr id="6" name="Slide Number Placeholder 5">
-            <a:extLst>
-              <a:ext uri="{FF2B5EF4-FFF2-40B4-BE49-F238E27FC236}">
-                <a16:creationId xmlns:a16="http://schemas.microsoft.com/office/drawing/2014/main" id="{134C72D2-EFDF-844A-8472-CB49A59B127B}"/>
-              </a:ext>
-            </a:extLst>
-          </p:cNvPr>
-          <p:cNvSpPr>
-            <a:spLocks noGrp="1"/>
-          </p:cNvSpPr>
-          <p:nvPr>
-            <p:ph type="sldNum" sz="quarter" idx="12"/>
-          </p:nvPr>
-        </p:nvSpPr>
-        <p:spPr>
-          <a:xfrm>
-            <a:off x="10206318" y="6356350"/>
-            <a:ext cx="1604682" cy="365125"/>
-          </a:xfrm>
-        </p:spPr>
-        <p:txBody>
-          <a:bodyPr/>
-          <a:lstStyle/>
-          <a:p>
+            <a:pPr>
+              <a:spcAft>
+                <a:spcPts val="600"/>
+              </a:spcAft>
+            </a:pPr>
             <a:fld id="{294A09A9-5501-47C1-A89A-A340965A2BE2}" type="slidenum">
               <a:rPr lang="en-US" smtClean="0"/>
-              <a:pPr/>
+              <a:pPr>
+                <a:spcAft>
+                  <a:spcPts val="600"/>
+                </a:spcAft>
+              </a:pPr>
               <a:t>5</a:t>
             </a:fld>
-            <a:endParaRPr lang="en-US" dirty="0"/>
+            <a:endParaRPr lang="en-US"/>
           </a:p>
         </p:txBody>
       </p:sp>
@@ -14158,11 +14119,16 @@
           </a:xfrm>
         </p:spPr>
         <p:txBody>
-          <a:bodyPr/>
+          <a:bodyPr anchor="b">
+            <a:normAutofit/>
+          </a:bodyPr>
           <a:lstStyle/>
           <a:p>
             <a:r>
-              <a:rPr lang="en-US" dirty="0"/>
+              <a:rPr lang="en-US" dirty="0">
+                <a:latin typeface="Times New Roman" panose="02020603050405020304" pitchFamily="18" charset="0"/>
+                <a:cs typeface="Times New Roman" panose="02020603050405020304" pitchFamily="18" charset="0"/>
+              </a:rPr>
               <a:t>Implementation</a:t>
             </a:r>
           </a:p>
@@ -14170,10 +14136,10 @@
       </p:sp>
       <p:sp>
         <p:nvSpPr>
-          <p:cNvPr id="3" name="Content Placeholder 2">
-            <a:extLst>
-              <a:ext uri="{FF2B5EF4-FFF2-40B4-BE49-F238E27FC236}">
-                <a16:creationId xmlns:a16="http://schemas.microsoft.com/office/drawing/2014/main" id="{95B371F2-DBA5-415A-82C8-651F587B857A}"/>
+          <p:cNvPr id="4" name="Date Placeholder 3">
+            <a:extLst>
+              <a:ext uri="{FF2B5EF4-FFF2-40B4-BE49-F238E27FC236}">
+                <a16:creationId xmlns:a16="http://schemas.microsoft.com/office/drawing/2014/main" id="{DB056174-CBC5-7B48-9681-7DDAC423337E}"/>
               </a:ext>
             </a:extLst>
           </p:cNvPr>
@@ -14181,31 +14147,45 @@
             <a:spLocks noGrp="1"/>
           </p:cNvSpPr>
           <p:nvPr>
-            <p:ph type="body" idx="1"/>
+            <p:ph type="dt" sz="half" idx="2"/>
           </p:nvPr>
         </p:nvSpPr>
         <p:spPr>
           <a:xfrm>
-            <a:off x="160318" y="2274125"/>
-            <a:ext cx="10786358" cy="3815526"/>
-          </a:xfrm>
-        </p:spPr>
-        <p:txBody>
-          <a:bodyPr vert="horz" lIns="91440" tIns="45720" rIns="91440" bIns="45720" rtlCol="0" anchor="t">
+            <a:off x="381000" y="6356350"/>
+            <a:ext cx="1701018" cy="365125"/>
+          </a:xfrm>
+        </p:spPr>
+        <p:txBody>
+          <a:bodyPr anchor="ctr">
             <a:normAutofit/>
           </a:bodyPr>
           <a:lstStyle/>
           <a:p>
-            <a:endParaRPr lang="en-US" dirty="0"/>
-          </a:p>
-        </p:txBody>
-      </p:sp>
-      <p:sp>
-        <p:nvSpPr>
-          <p:cNvPr id="4" name="Date Placeholder 3">
-            <a:extLst>
-              <a:ext uri="{FF2B5EF4-FFF2-40B4-BE49-F238E27FC236}">
-                <a16:creationId xmlns:a16="http://schemas.microsoft.com/office/drawing/2014/main" id="{DB056174-CBC5-7B48-9681-7DDAC423337E}"/>
+            <a:pPr>
+              <a:spcAft>
+                <a:spcPts val="600"/>
+              </a:spcAft>
+            </a:pPr>
+            <a:fld id="{E1707CF3-9BC4-A745-ACDA-A73543D800FE}" type="datetime1">
+              <a:rPr lang="en-US" smtClean="0"/>
+              <a:pPr>
+                <a:spcAft>
+                  <a:spcPts val="600"/>
+                </a:spcAft>
+              </a:pPr>
+              <a:t>3/29/2023</a:t>
+            </a:fld>
+            <a:endParaRPr lang="en-US"/>
+          </a:p>
+        </p:txBody>
+      </p:sp>
+      <p:sp>
+        <p:nvSpPr>
+          <p:cNvPr id="5" name="Footer Placeholder 4">
+            <a:extLst>
+              <a:ext uri="{FF2B5EF4-FFF2-40B4-BE49-F238E27FC236}">
+                <a16:creationId xmlns:a16="http://schemas.microsoft.com/office/drawing/2014/main" id="{D593FA18-50D6-0344-B477-1D7C91CF4029}"/>
               </a:ext>
             </a:extLst>
           </p:cNvPr>
@@ -14213,34 +14193,48 @@
             <a:spLocks noGrp="1"/>
           </p:cNvSpPr>
           <p:nvPr>
-            <p:ph type="dt" sz="half" idx="10"/>
+            <p:ph type="ftr" sz="quarter" idx="3"/>
           </p:nvPr>
         </p:nvSpPr>
         <p:spPr>
           <a:xfrm>
-            <a:off x="381000" y="6356350"/>
-            <a:ext cx="2743200" cy="365125"/>
-          </a:xfrm>
-        </p:spPr>
-        <p:txBody>
-          <a:bodyPr/>
+            <a:off x="4038600" y="6356350"/>
+            <a:ext cx="4114800" cy="365125"/>
+          </a:xfrm>
+        </p:spPr>
+        <p:txBody>
+          <a:bodyPr anchor="ctr">
+            <a:normAutofit/>
+          </a:bodyPr>
           <a:lstStyle/>
           <a:p>
-            <a:fld id="{E1707CF3-9BC4-A745-ACDA-A73543D800FE}" type="datetime1">
-              <a:rPr lang="en-US" smtClean="0"/>
-              <a:pPr/>
-              <a:t>3/28/2023</a:t>
-            </a:fld>
-            <a:endParaRPr lang="en-US" dirty="0"/>
-          </a:p>
-        </p:txBody>
-      </p:sp>
-      <p:sp>
-        <p:nvSpPr>
-          <p:cNvPr id="5" name="Footer Placeholder 4">
-            <a:extLst>
-              <a:ext uri="{FF2B5EF4-FFF2-40B4-BE49-F238E27FC236}">
-                <a16:creationId xmlns:a16="http://schemas.microsoft.com/office/drawing/2014/main" id="{D593FA18-50D6-0344-B477-1D7C91CF4029}"/>
+            <a:pPr>
+              <a:spcAft>
+                <a:spcPts val="600"/>
+              </a:spcAft>
+            </a:pPr>
+            <a:r>
+              <a:rPr lang="en-US" b="1" i="0" err="1">
+                <a:effectLst/>
+              </a:rPr>
+              <a:t>UnitTests</a:t>
+            </a:r>
+            <a:r>
+              <a:rPr lang="en-US" b="1" i="0">
+                <a:effectLst/>
+              </a:rPr>
+              <a:t> for Temporal Memory Algorithm</a:t>
+            </a:r>
+            <a:endParaRPr lang="en-US"/>
+          </a:p>
+        </p:txBody>
+      </p:sp>
+      <p:sp>
+        <p:nvSpPr>
+          <p:cNvPr id="6" name="Slide Number Placeholder 5">
+            <a:extLst>
+              <a:ext uri="{FF2B5EF4-FFF2-40B4-BE49-F238E27FC236}">
+                <a16:creationId xmlns:a16="http://schemas.microsoft.com/office/drawing/2014/main" id="{134C72D2-EFDF-844A-8472-CB49A59B127B}"/>
               </a:ext>
             </a:extLst>
           </p:cNvPr>
@@ -14248,45 +14242,45 @@
             <a:spLocks noGrp="1"/>
           </p:cNvSpPr>
           <p:nvPr>
-            <p:ph type="ftr" sz="quarter" idx="11"/>
+            <p:ph type="sldNum" sz="quarter" idx="4"/>
           </p:nvPr>
         </p:nvSpPr>
         <p:spPr>
           <a:xfrm>
-            <a:off x="4038600" y="6356350"/>
-            <a:ext cx="4114800" cy="365125"/>
-          </a:xfrm>
-        </p:spPr>
-        <p:txBody>
-          <a:bodyPr/>
+            <a:off x="10153276" y="6356350"/>
+            <a:ext cx="1657723" cy="365125"/>
+          </a:xfrm>
+        </p:spPr>
+        <p:txBody>
+          <a:bodyPr anchor="ctr">
+            <a:normAutofit/>
+          </a:bodyPr>
           <a:lstStyle/>
           <a:p>
-            <a:r>
-              <a:rPr lang="en-US" sz="1200" b="1" i="0" dirty="0" err="1">
-                <a:effectLst/>
-                <a:latin typeface="Arabic Typesetting" panose="020B0604020202020204" pitchFamily="66" charset="-78"/>
-                <a:cs typeface="Arabic Typesetting" panose="020B0604020202020204" pitchFamily="66" charset="-78"/>
-              </a:rPr>
-              <a:t>UnitTests</a:t>
-            </a:r>
-            <a:r>
-              <a:rPr lang="en-US" sz="1200" b="1" i="0" dirty="0">
-                <a:effectLst/>
-                <a:latin typeface="Arabic Typesetting" panose="020B0604020202020204" pitchFamily="66" charset="-78"/>
-                <a:cs typeface="Arabic Typesetting" panose="020B0604020202020204" pitchFamily="66" charset="-78"/>
-              </a:rPr>
-              <a:t> for Temporal Memory Algorithm</a:t>
-            </a:r>
-            <a:endParaRPr lang="en-US" dirty="0"/>
-          </a:p>
-        </p:txBody>
-      </p:sp>
-      <p:sp>
-        <p:nvSpPr>
-          <p:cNvPr id="6" name="Slide Number Placeholder 5">
-            <a:extLst>
-              <a:ext uri="{FF2B5EF4-FFF2-40B4-BE49-F238E27FC236}">
-                <a16:creationId xmlns:a16="http://schemas.microsoft.com/office/drawing/2014/main" id="{134C72D2-EFDF-844A-8472-CB49A59B127B}"/>
+            <a:pPr>
+              <a:spcAft>
+                <a:spcPts val="600"/>
+              </a:spcAft>
+            </a:pPr>
+            <a:fld id="{294A09A9-5501-47C1-A89A-A340965A2BE2}" type="slidenum">
+              <a:rPr lang="en-US" smtClean="0"/>
+              <a:pPr>
+                <a:spcAft>
+                  <a:spcPts val="600"/>
+                </a:spcAft>
+              </a:pPr>
+              <a:t>6</a:t>
+            </a:fld>
+            <a:endParaRPr lang="en-US"/>
+          </a:p>
+        </p:txBody>
+      </p:sp>
+      <p:sp>
+        <p:nvSpPr>
+          <p:cNvPr id="10" name="Content Placeholder 9">
+            <a:extLst>
+              <a:ext uri="{FF2B5EF4-FFF2-40B4-BE49-F238E27FC236}">
+                <a16:creationId xmlns:a16="http://schemas.microsoft.com/office/drawing/2014/main" id="{72B65DD5-9795-8B33-F19E-49E83F348E32}"/>
               </a:ext>
             </a:extLst>
           </p:cNvPr>
@@ -14294,24 +14288,14 @@
             <a:spLocks noGrp="1"/>
           </p:cNvSpPr>
           <p:nvPr>
-            <p:ph type="sldNum" sz="quarter" idx="12"/>
+            <p:ph idx="1"/>
           </p:nvPr>
         </p:nvSpPr>
-        <p:spPr>
-          <a:xfrm>
-            <a:off x="10206318" y="6356350"/>
-            <a:ext cx="1604682" cy="365125"/>
-          </a:xfrm>
-        </p:spPr>
+        <p:spPr/>
         <p:txBody>
           <a:bodyPr/>
           <a:lstStyle/>
           <a:p>
-            <a:fld id="{294A09A9-5501-47C1-A89A-A340965A2BE2}" type="slidenum">
-              <a:rPr lang="en-US" smtClean="0"/>
-              <a:pPr/>
-              <a:t>6</a:t>
-            </a:fld>
             <a:endParaRPr lang="en-US" dirty="0"/>
           </a:p>
         </p:txBody>
@@ -14369,7 +14353,9 @@
           </a:xfrm>
         </p:spPr>
         <p:txBody>
-          <a:bodyPr/>
+          <a:bodyPr anchor="b">
+            <a:normAutofit/>
+          </a:bodyPr>
           <a:lstStyle/>
           <a:p>
             <a:r>
@@ -14379,12 +14365,41 @@
           </a:p>
         </p:txBody>
       </p:sp>
-      <p:sp>
-        <p:nvSpPr>
-          <p:cNvPr id="3" name="Content Placeholder 2">
-            <a:extLst>
-              <a:ext uri="{FF2B5EF4-FFF2-40B4-BE49-F238E27FC236}">
-                <a16:creationId xmlns:a16="http://schemas.microsoft.com/office/drawing/2014/main" id="{95B371F2-DBA5-415A-82C8-651F587B857A}"/>
+      <p:pic>
+        <p:nvPicPr>
+          <p:cNvPr id="8" name="Content Placeholder 7" descr="A screenshot of a computer&#10;&#10;Description automatically generated with medium confidence">
+            <a:extLst>
+              <a:ext uri="{FF2B5EF4-FFF2-40B4-BE49-F238E27FC236}">
+                <a16:creationId xmlns:a16="http://schemas.microsoft.com/office/drawing/2014/main" id="{6BADB495-630C-E6BE-B7EE-EB7F9568B405}"/>
+              </a:ext>
+            </a:extLst>
+          </p:cNvPr>
+          <p:cNvPicPr>
+            <a:picLocks noGrp="1" noChangeAspect="1"/>
+          </p:cNvPicPr>
+          <p:nvPr>
+            <p:ph idx="1"/>
+          </p:nvPr>
+        </p:nvPicPr>
+        <p:blipFill>
+          <a:blip r:embed="rId2"/>
+          <a:stretch>
+            <a:fillRect/>
+          </a:stretch>
+        </p:blipFill>
+        <p:spPr>
+          <a:xfrm>
+            <a:off x="3064139" y="2087563"/>
+            <a:ext cx="7653021" cy="4268787"/>
+          </a:xfrm>
+        </p:spPr>
+      </p:pic>
+      <p:sp>
+        <p:nvSpPr>
+          <p:cNvPr id="4" name="Date Placeholder 3">
+            <a:extLst>
+              <a:ext uri="{FF2B5EF4-FFF2-40B4-BE49-F238E27FC236}">
+                <a16:creationId xmlns:a16="http://schemas.microsoft.com/office/drawing/2014/main" id="{DB056174-CBC5-7B48-9681-7DDAC423337E}"/>
               </a:ext>
             </a:extLst>
           </p:cNvPr>
@@ -14392,31 +14407,45 @@
             <a:spLocks noGrp="1"/>
           </p:cNvSpPr>
           <p:nvPr>
-            <p:ph type="body" idx="1"/>
+            <p:ph type="dt" sz="half" idx="2"/>
           </p:nvPr>
         </p:nvSpPr>
         <p:spPr>
           <a:xfrm>
-            <a:off x="160318" y="2274125"/>
-            <a:ext cx="10786358" cy="3815526"/>
-          </a:xfrm>
-        </p:spPr>
-        <p:txBody>
-          <a:bodyPr vert="horz" lIns="91440" tIns="45720" rIns="91440" bIns="45720" rtlCol="0" anchor="t">
+            <a:off x="381000" y="6356350"/>
+            <a:ext cx="1701018" cy="365125"/>
+          </a:xfrm>
+        </p:spPr>
+        <p:txBody>
+          <a:bodyPr anchor="ctr">
             <a:normAutofit/>
           </a:bodyPr>
           <a:lstStyle/>
           <a:p>
-            <a:endParaRPr lang="en-US" dirty="0"/>
-          </a:p>
-        </p:txBody>
-      </p:sp>
-      <p:sp>
-        <p:nvSpPr>
-          <p:cNvPr id="4" name="Date Placeholder 3">
-            <a:extLst>
-              <a:ext uri="{FF2B5EF4-FFF2-40B4-BE49-F238E27FC236}">
-                <a16:creationId xmlns:a16="http://schemas.microsoft.com/office/drawing/2014/main" id="{DB056174-CBC5-7B48-9681-7DDAC423337E}"/>
+            <a:pPr>
+              <a:spcAft>
+                <a:spcPts val="600"/>
+              </a:spcAft>
+            </a:pPr>
+            <a:fld id="{E1707CF3-9BC4-A745-ACDA-A73543D800FE}" type="datetime1">
+              <a:rPr lang="en-US" smtClean="0"/>
+              <a:pPr>
+                <a:spcAft>
+                  <a:spcPts val="600"/>
+                </a:spcAft>
+              </a:pPr>
+              <a:t>3/29/2023</a:t>
+            </a:fld>
+            <a:endParaRPr lang="en-US"/>
+          </a:p>
+        </p:txBody>
+      </p:sp>
+      <p:sp>
+        <p:nvSpPr>
+          <p:cNvPr id="5" name="Footer Placeholder 4">
+            <a:extLst>
+              <a:ext uri="{FF2B5EF4-FFF2-40B4-BE49-F238E27FC236}">
+                <a16:creationId xmlns:a16="http://schemas.microsoft.com/office/drawing/2014/main" id="{D593FA18-50D6-0344-B477-1D7C91CF4029}"/>
               </a:ext>
             </a:extLst>
           </p:cNvPr>
@@ -14424,34 +14453,48 @@
             <a:spLocks noGrp="1"/>
           </p:cNvSpPr>
           <p:nvPr>
-            <p:ph type="dt" sz="half" idx="10"/>
+            <p:ph type="ftr" sz="quarter" idx="3"/>
           </p:nvPr>
         </p:nvSpPr>
         <p:spPr>
           <a:xfrm>
-            <a:off x="381000" y="6356350"/>
-            <a:ext cx="2743200" cy="365125"/>
-          </a:xfrm>
-        </p:spPr>
-        <p:txBody>
-          <a:bodyPr/>
+            <a:off x="4038600" y="6356350"/>
+            <a:ext cx="4114800" cy="365125"/>
+          </a:xfrm>
+        </p:spPr>
+        <p:txBody>
+          <a:bodyPr anchor="ctr">
+            <a:normAutofit/>
+          </a:bodyPr>
           <a:lstStyle/>
           <a:p>
-            <a:fld id="{E1707CF3-9BC4-A745-ACDA-A73543D800FE}" type="datetime1">
-              <a:rPr lang="en-US" smtClean="0"/>
-              <a:pPr/>
-              <a:t>3/28/2023</a:t>
-            </a:fld>
-            <a:endParaRPr lang="en-US" dirty="0"/>
-          </a:p>
-        </p:txBody>
-      </p:sp>
-      <p:sp>
-        <p:nvSpPr>
-          <p:cNvPr id="5" name="Footer Placeholder 4">
-            <a:extLst>
-              <a:ext uri="{FF2B5EF4-FFF2-40B4-BE49-F238E27FC236}">
-                <a16:creationId xmlns:a16="http://schemas.microsoft.com/office/drawing/2014/main" id="{D593FA18-50D6-0344-B477-1D7C91CF4029}"/>
+            <a:pPr>
+              <a:spcAft>
+                <a:spcPts val="600"/>
+              </a:spcAft>
+            </a:pPr>
+            <a:r>
+              <a:rPr lang="en-US" b="1" i="0" err="1">
+                <a:effectLst/>
+              </a:rPr>
+              <a:t>UnitTests</a:t>
+            </a:r>
+            <a:r>
+              <a:rPr lang="en-US" b="1" i="0">
+                <a:effectLst/>
+              </a:rPr>
+              <a:t> for Temporal Memory Algorithm</a:t>
+            </a:r>
+            <a:endParaRPr lang="en-US"/>
+          </a:p>
+        </p:txBody>
+      </p:sp>
+      <p:sp>
+        <p:nvSpPr>
+          <p:cNvPr id="6" name="Slide Number Placeholder 5">
+            <a:extLst>
+              <a:ext uri="{FF2B5EF4-FFF2-40B4-BE49-F238E27FC236}">
+                <a16:creationId xmlns:a16="http://schemas.microsoft.com/office/drawing/2014/main" id="{134C72D2-EFDF-844A-8472-CB49A59B127B}"/>
               </a:ext>
             </a:extLst>
           </p:cNvPr>
@@ -14459,71 +14502,36 @@
             <a:spLocks noGrp="1"/>
           </p:cNvSpPr>
           <p:nvPr>
-            <p:ph type="ftr" sz="quarter" idx="11"/>
+            <p:ph type="sldNum" sz="quarter" idx="4"/>
           </p:nvPr>
         </p:nvSpPr>
         <p:spPr>
           <a:xfrm>
-            <a:off x="4038600" y="6356350"/>
-            <a:ext cx="4114800" cy="365125"/>
-          </a:xfrm>
-        </p:spPr>
-        <p:txBody>
-          <a:bodyPr/>
+            <a:off x="10153276" y="6356350"/>
+            <a:ext cx="1657723" cy="365125"/>
+          </a:xfrm>
+        </p:spPr>
+        <p:txBody>
+          <a:bodyPr anchor="ctr">
+            <a:normAutofit/>
+          </a:bodyPr>
           <a:lstStyle/>
           <a:p>
-            <a:r>
-              <a:rPr lang="en-US" sz="1200" b="1" i="0" dirty="0" err="1">
-                <a:effectLst/>
-                <a:latin typeface="Arabic Typesetting" panose="020B0604020202020204" pitchFamily="66" charset="-78"/>
-                <a:cs typeface="Arabic Typesetting" panose="020B0604020202020204" pitchFamily="66" charset="-78"/>
-              </a:rPr>
-              <a:t>UnitTests</a:t>
-            </a:r>
-            <a:r>
-              <a:rPr lang="en-US" sz="1200" b="1" i="0" dirty="0">
-                <a:effectLst/>
-                <a:latin typeface="Arabic Typesetting" panose="020B0604020202020204" pitchFamily="66" charset="-78"/>
-                <a:cs typeface="Arabic Typesetting" panose="020B0604020202020204" pitchFamily="66" charset="-78"/>
-              </a:rPr>
-              <a:t> for Temporal Memory Algorithm</a:t>
-            </a:r>
-            <a:endParaRPr lang="en-US" dirty="0"/>
-          </a:p>
-        </p:txBody>
-      </p:sp>
-      <p:sp>
-        <p:nvSpPr>
-          <p:cNvPr id="6" name="Slide Number Placeholder 5">
-            <a:extLst>
-              <a:ext uri="{FF2B5EF4-FFF2-40B4-BE49-F238E27FC236}">
-                <a16:creationId xmlns:a16="http://schemas.microsoft.com/office/drawing/2014/main" id="{134C72D2-EFDF-844A-8472-CB49A59B127B}"/>
-              </a:ext>
-            </a:extLst>
-          </p:cNvPr>
-          <p:cNvSpPr>
-            <a:spLocks noGrp="1"/>
-          </p:cNvSpPr>
-          <p:nvPr>
-            <p:ph type="sldNum" sz="quarter" idx="12"/>
-          </p:nvPr>
-        </p:nvSpPr>
-        <p:spPr>
-          <a:xfrm>
-            <a:off x="10206318" y="6356350"/>
-            <a:ext cx="1604682" cy="365125"/>
-          </a:xfrm>
-        </p:spPr>
-        <p:txBody>
-          <a:bodyPr/>
-          <a:lstStyle/>
-          <a:p>
+            <a:pPr>
+              <a:spcAft>
+                <a:spcPts val="600"/>
+              </a:spcAft>
+            </a:pPr>
             <a:fld id="{294A09A9-5501-47C1-A89A-A340965A2BE2}" type="slidenum">
               <a:rPr lang="en-US" smtClean="0"/>
-              <a:pPr/>
+              <a:pPr>
+                <a:spcAft>
+                  <a:spcPts val="600"/>
+                </a:spcAft>
+              </a:pPr>
               <a:t>7</a:t>
             </a:fld>
-            <a:endParaRPr lang="en-US" dirty="0"/>
+            <a:endParaRPr lang="en-US"/>
           </a:p>
         </p:txBody>
       </p:sp>
@@ -14562,7 +14570,7 @@
           <p:cNvPr id="2" name="Title 1">
             <a:extLst>
               <a:ext uri="{FF2B5EF4-FFF2-40B4-BE49-F238E27FC236}">
-                <a16:creationId xmlns:a16="http://schemas.microsoft.com/office/drawing/2014/main" id="{8C543F67-9C70-4748-8C0C-3A7863422F99}"/>
+                <a16:creationId xmlns:a16="http://schemas.microsoft.com/office/drawing/2014/main" id="{33AF65A7-995A-9F45-891C-82D9B9D40801}"/>
               </a:ext>
             </a:extLst>
           </p:cNvPr>
@@ -14575,27 +14583,36 @@
         </p:nvSpPr>
         <p:spPr>
           <a:xfrm>
-            <a:off x="1167492" y="381000"/>
-            <a:ext cx="9779183" cy="1325563"/>
-          </a:xfrm>
-        </p:spPr>
-        <p:txBody>
-          <a:bodyPr/>
+            <a:off x="1889961" y="1791018"/>
+            <a:ext cx="8412079" cy="2810460"/>
+          </a:xfrm>
+        </p:spPr>
+        <p:txBody>
+          <a:bodyPr>
+            <a:normAutofit/>
+          </a:bodyPr>
           <a:lstStyle/>
           <a:p>
             <a:r>
-              <a:rPr lang="en-US" dirty="0"/>
-              <a:t>limitation</a:t>
-            </a:r>
-          </a:p>
-        </p:txBody>
-      </p:sp>
-      <p:sp>
-        <p:nvSpPr>
-          <p:cNvPr id="3" name="Content Placeholder 2">
-            <a:extLst>
-              <a:ext uri="{FF2B5EF4-FFF2-40B4-BE49-F238E27FC236}">
-                <a16:creationId xmlns:a16="http://schemas.microsoft.com/office/drawing/2014/main" id="{95B371F2-DBA5-415A-82C8-651F587B857A}"/>
+              <a:rPr lang="en-US" sz="2400" dirty="0"/>
+              <a:t>Conclusion</a:t>
+            </a:r>
+            <a:br>
+              <a:rPr lang="en-US" sz="2400" dirty="0"/>
+            </a:br>
+            <a:br>
+              <a:rPr lang="en-US" sz="2400" dirty="0"/>
+            </a:br>
+            <a:endParaRPr lang="en-US" sz="4400" dirty="0"/>
+          </a:p>
+        </p:txBody>
+      </p:sp>
+      <p:sp>
+        <p:nvSpPr>
+          <p:cNvPr id="13" name="Text Placeholder 5">
+            <a:extLst>
+              <a:ext uri="{FF2B5EF4-FFF2-40B4-BE49-F238E27FC236}">
+                <a16:creationId xmlns:a16="http://schemas.microsoft.com/office/drawing/2014/main" id="{6118A1B7-08BA-6B43-BBA8-952377DF944D}"/>
               </a:ext>
             </a:extLst>
           </p:cNvPr>
@@ -14603,39 +14620,65 @@
             <a:spLocks noGrp="1"/>
           </p:cNvSpPr>
           <p:nvPr>
-            <p:ph type="body" idx="1"/>
+            <p:ph type="body" sz="quarter" idx="13"/>
           </p:nvPr>
         </p:nvSpPr>
         <p:spPr>
           <a:xfrm>
-            <a:off x="160317" y="2274125"/>
-            <a:ext cx="12120675" cy="3815526"/>
-          </a:xfrm>
-        </p:spPr>
-        <p:txBody>
-          <a:bodyPr vert="horz" lIns="91440" tIns="45720" rIns="91440" bIns="45720" rtlCol="0" anchor="t">
-            <a:normAutofit/>
-          </a:bodyPr>
+            <a:off x="1502619" y="543354"/>
+            <a:ext cx="1364297" cy="1094521"/>
+          </a:xfrm>
+        </p:spPr>
+        <p:txBody>
+          <a:bodyPr/>
           <a:lstStyle/>
           <a:p>
             <a:r>
-              <a:rPr lang="en-US" sz="1600" dirty="0"/>
-              <a:t>Due to lack of time, we could not do enough research</a:t>
-            </a:r>
-            <a:r>
-              <a:rPr lang="en-US" sz="1600"/>
-              <a:t>. </a:t>
-            </a:r>
-            <a:endParaRPr lang="en-US" sz="1600" dirty="0"/>
-          </a:p>
-        </p:txBody>
-      </p:sp>
-      <p:sp>
-        <p:nvSpPr>
-          <p:cNvPr id="4" name="Date Placeholder 3">
-            <a:extLst>
-              <a:ext uri="{FF2B5EF4-FFF2-40B4-BE49-F238E27FC236}">
-                <a16:creationId xmlns:a16="http://schemas.microsoft.com/office/drawing/2014/main" id="{DB056174-CBC5-7B48-9681-7DDAC423337E}"/>
+              <a:rPr lang="en-US" dirty="0"/>
+              <a:t>“</a:t>
+            </a:r>
+          </a:p>
+        </p:txBody>
+      </p:sp>
+      <p:sp>
+        <p:nvSpPr>
+          <p:cNvPr id="14" name="Text Placeholder 7">
+            <a:extLst>
+              <a:ext uri="{FF2B5EF4-FFF2-40B4-BE49-F238E27FC236}">
+                <a16:creationId xmlns:a16="http://schemas.microsoft.com/office/drawing/2014/main" id="{A1F17760-D90A-AB46-A4E0-31B2684E3F5E}"/>
+              </a:ext>
+            </a:extLst>
+          </p:cNvPr>
+          <p:cNvSpPr>
+            <a:spLocks noGrp="1"/>
+          </p:cNvSpPr>
+          <p:nvPr>
+            <p:ph type="body" sz="quarter" idx="15"/>
+          </p:nvPr>
+        </p:nvSpPr>
+        <p:spPr>
+          <a:xfrm>
+            <a:off x="9420876" y="3426615"/>
+            <a:ext cx="1364297" cy="1094521"/>
+          </a:xfrm>
+        </p:spPr>
+        <p:txBody>
+          <a:bodyPr/>
+          <a:lstStyle/>
+          <a:p>
+            <a:r>
+              <a:rPr lang="en-US" dirty="0"/>
+              <a:t>”</a:t>
+            </a:r>
+          </a:p>
+        </p:txBody>
+      </p:sp>
+      <p:sp>
+        <p:nvSpPr>
+          <p:cNvPr id="3" name="Date Placeholder 2">
+            <a:extLst>
+              <a:ext uri="{FF2B5EF4-FFF2-40B4-BE49-F238E27FC236}">
+                <a16:creationId xmlns:a16="http://schemas.microsoft.com/office/drawing/2014/main" id="{8D3F7063-A64B-CB42-8BBF-BF52424269A8}"/>
               </a:ext>
             </a:extLst>
           </p:cNvPr>
@@ -14646,20 +14689,14 @@
             <p:ph type="dt" sz="half" idx="10"/>
           </p:nvPr>
         </p:nvSpPr>
-        <p:spPr>
-          <a:xfrm>
-            <a:off x="381000" y="6356350"/>
-            <a:ext cx="2743200" cy="365125"/>
-          </a:xfrm>
-        </p:spPr>
+        <p:spPr/>
         <p:txBody>
           <a:bodyPr/>
           <a:lstStyle/>
           <a:p>
-            <a:fld id="{E1707CF3-9BC4-A745-ACDA-A73543D800FE}" type="datetime1">
+            <a:fld id="{4CF75428-5BE0-934D-BB71-675F8E23A386}" type="datetime1">
               <a:rPr lang="en-US" smtClean="0"/>
-              <a:pPr/>
-              <a:t>3/28/2023</a:t>
+              <a:t>3/29/2023</a:t>
             </a:fld>
             <a:endParaRPr lang="en-US" dirty="0"/>
           </a:p>
@@ -14667,10 +14704,10 @@
       </p:sp>
       <p:sp>
         <p:nvSpPr>
-          <p:cNvPr id="5" name="Footer Placeholder 4">
-            <a:extLst>
-              <a:ext uri="{FF2B5EF4-FFF2-40B4-BE49-F238E27FC236}">
-                <a16:creationId xmlns:a16="http://schemas.microsoft.com/office/drawing/2014/main" id="{D593FA18-50D6-0344-B477-1D7C91CF4029}"/>
+          <p:cNvPr id="4" name="Footer Placeholder 3">
+            <a:extLst>
+              <a:ext uri="{FF2B5EF4-FFF2-40B4-BE49-F238E27FC236}">
+                <a16:creationId xmlns:a16="http://schemas.microsoft.com/office/drawing/2014/main" id="{6E4EA976-8646-0143-BA18-8675E6FA5EB7}"/>
               </a:ext>
             </a:extLst>
           </p:cNvPr>
@@ -14681,12 +14718,7 @@
             <p:ph type="ftr" sz="quarter" idx="11"/>
           </p:nvPr>
         </p:nvSpPr>
-        <p:spPr>
-          <a:xfrm>
-            <a:off x="4038600" y="6356350"/>
-            <a:ext cx="4114800" cy="365125"/>
-          </a:xfrm>
-        </p:spPr>
+        <p:spPr/>
         <p:txBody>
           <a:bodyPr/>
           <a:lstStyle/>
@@ -14713,10 +14745,10 @@
       </p:sp>
       <p:sp>
         <p:nvSpPr>
-          <p:cNvPr id="6" name="Slide Number Placeholder 5">
-            <a:extLst>
-              <a:ext uri="{FF2B5EF4-FFF2-40B4-BE49-F238E27FC236}">
-                <a16:creationId xmlns:a16="http://schemas.microsoft.com/office/drawing/2014/main" id="{134C72D2-EFDF-844A-8472-CB49A59B127B}"/>
+          <p:cNvPr id="5" name="Slide Number Placeholder 4">
+            <a:extLst>
+              <a:ext uri="{FF2B5EF4-FFF2-40B4-BE49-F238E27FC236}">
+                <a16:creationId xmlns:a16="http://schemas.microsoft.com/office/drawing/2014/main" id="{7003A5E2-8F37-D546-BCD9-24A2037BB54D}"/>
               </a:ext>
             </a:extLst>
           </p:cNvPr>
@@ -14727,12 +14759,7 @@
             <p:ph type="sldNum" sz="quarter" idx="12"/>
           </p:nvPr>
         </p:nvSpPr>
-        <p:spPr>
-          <a:xfrm>
-            <a:off x="10206318" y="6356350"/>
-            <a:ext cx="1604682" cy="365125"/>
-          </a:xfrm>
-        </p:spPr>
+        <p:spPr/>
         <p:txBody>
           <a:bodyPr/>
           <a:lstStyle/>
@@ -14749,7 +14776,7 @@
     </p:spTree>
     <p:extLst>
       <p:ext uri="{BB962C8B-B14F-4D97-AF65-F5344CB8AC3E}">
-        <p14:creationId xmlns:p14="http://schemas.microsoft.com/office/powerpoint/2010/main" val="2531238093"/>
+        <p14:creationId xmlns:p14="http://schemas.microsoft.com/office/powerpoint/2010/main" val="2639983765"/>
       </p:ext>
     </p:extLst>
   </p:cSld>
@@ -14781,7 +14808,7 @@
           <p:cNvPr id="2" name="Title 1">
             <a:extLst>
               <a:ext uri="{FF2B5EF4-FFF2-40B4-BE49-F238E27FC236}">
-                <a16:creationId xmlns:a16="http://schemas.microsoft.com/office/drawing/2014/main" id="{33AF65A7-995A-9F45-891C-82D9B9D40801}"/>
+                <a16:creationId xmlns:a16="http://schemas.microsoft.com/office/drawing/2014/main" id="{69FAE308-3076-43DB-B834-DA0B0AE19AF9}"/>
               </a:ext>
             </a:extLst>
           </p:cNvPr>
@@ -14789,13 +14816,46 @@
             <a:spLocks noGrp="1"/>
           </p:cNvSpPr>
           <p:nvPr>
-            <p:ph type="title"/>
+            <p:ph type="ctrTitle"/>
           </p:nvPr>
         </p:nvSpPr>
         <p:spPr>
           <a:xfrm>
-            <a:off x="1889961" y="1791018"/>
-            <a:ext cx="8412079" cy="2810460"/>
+            <a:off x="1167494" y="1122363"/>
+            <a:ext cx="6220278" cy="2387600"/>
+          </a:xfrm>
+        </p:spPr>
+        <p:txBody>
+          <a:bodyPr/>
+          <a:lstStyle/>
+          <a:p>
+            <a:r>
+              <a:rPr lang="en-US" dirty="0"/>
+              <a:t>Thank you</a:t>
+            </a:r>
+          </a:p>
+        </p:txBody>
+      </p:sp>
+      <p:sp>
+        <p:nvSpPr>
+          <p:cNvPr id="3" name="Content Placeholder 2">
+            <a:extLst>
+              <a:ext uri="{FF2B5EF4-FFF2-40B4-BE49-F238E27FC236}">
+                <a16:creationId xmlns:a16="http://schemas.microsoft.com/office/drawing/2014/main" id="{BABC2CE0-8806-4B2A-A10A-32984D317434}"/>
+              </a:ext>
+            </a:extLst>
+          </p:cNvPr>
+          <p:cNvSpPr>
+            <a:spLocks noGrp="1"/>
+          </p:cNvSpPr>
+          <p:nvPr>
+            <p:ph type="subTitle" idx="1"/>
+          </p:nvPr>
+        </p:nvSpPr>
+        <p:spPr>
+          <a:xfrm>
+            <a:off x="1167493" y="3602038"/>
+            <a:ext cx="6220277" cy="2247219"/>
           </a:xfrm>
         </p:spPr>
         <p:txBody>
@@ -14804,182 +14864,6 @@
           </a:bodyPr>
           <a:lstStyle/>
           <a:p>
-            <a:r>
-              <a:rPr lang="en-US" sz="2400" dirty="0"/>
-              <a:t>Conclusion</a:t>
-            </a:r>
-            <a:br>
-              <a:rPr lang="en-US" sz="2400" dirty="0"/>
-            </a:br>
-            <a:br>
-              <a:rPr lang="en-US" sz="2400" dirty="0"/>
-            </a:br>
-            <a:endParaRPr lang="en-US" sz="4400" dirty="0"/>
-          </a:p>
-        </p:txBody>
-      </p:sp>
-      <p:sp>
-        <p:nvSpPr>
-          <p:cNvPr id="13" name="Text Placeholder 5">
-            <a:extLst>
-              <a:ext uri="{FF2B5EF4-FFF2-40B4-BE49-F238E27FC236}">
-                <a16:creationId xmlns:a16="http://schemas.microsoft.com/office/drawing/2014/main" id="{6118A1B7-08BA-6B43-BBA8-952377DF944D}"/>
-              </a:ext>
-            </a:extLst>
-          </p:cNvPr>
-          <p:cNvSpPr>
-            <a:spLocks noGrp="1"/>
-          </p:cNvSpPr>
-          <p:nvPr>
-            <p:ph type="body" sz="quarter" idx="13"/>
-          </p:nvPr>
-        </p:nvSpPr>
-        <p:spPr>
-          <a:xfrm>
-            <a:off x="1502619" y="543354"/>
-            <a:ext cx="1364297" cy="1094521"/>
-          </a:xfrm>
-        </p:spPr>
-        <p:txBody>
-          <a:bodyPr/>
-          <a:lstStyle/>
-          <a:p>
-            <a:r>
-              <a:rPr lang="en-US" dirty="0"/>
-              <a:t>“</a:t>
-            </a:r>
-          </a:p>
-        </p:txBody>
-      </p:sp>
-      <p:sp>
-        <p:nvSpPr>
-          <p:cNvPr id="14" name="Text Placeholder 7">
-            <a:extLst>
-              <a:ext uri="{FF2B5EF4-FFF2-40B4-BE49-F238E27FC236}">
-                <a16:creationId xmlns:a16="http://schemas.microsoft.com/office/drawing/2014/main" id="{A1F17760-D90A-AB46-A4E0-31B2684E3F5E}"/>
-              </a:ext>
-            </a:extLst>
-          </p:cNvPr>
-          <p:cNvSpPr>
-            <a:spLocks noGrp="1"/>
-          </p:cNvSpPr>
-          <p:nvPr>
-            <p:ph type="body" sz="quarter" idx="15"/>
-          </p:nvPr>
-        </p:nvSpPr>
-        <p:spPr>
-          <a:xfrm>
-            <a:off x="9420876" y="3426615"/>
-            <a:ext cx="1364297" cy="1094521"/>
-          </a:xfrm>
-        </p:spPr>
-        <p:txBody>
-          <a:bodyPr/>
-          <a:lstStyle/>
-          <a:p>
-            <a:r>
-              <a:rPr lang="en-US" dirty="0"/>
-              <a:t>”</a:t>
-            </a:r>
-          </a:p>
-        </p:txBody>
-      </p:sp>
-      <p:sp>
-        <p:nvSpPr>
-          <p:cNvPr id="3" name="Date Placeholder 2">
-            <a:extLst>
-              <a:ext uri="{FF2B5EF4-FFF2-40B4-BE49-F238E27FC236}">
-                <a16:creationId xmlns:a16="http://schemas.microsoft.com/office/drawing/2014/main" id="{8D3F7063-A64B-CB42-8BBF-BF52424269A8}"/>
-              </a:ext>
-            </a:extLst>
-          </p:cNvPr>
-          <p:cNvSpPr>
-            <a:spLocks noGrp="1"/>
-          </p:cNvSpPr>
-          <p:nvPr>
-            <p:ph type="dt" sz="half" idx="10"/>
-          </p:nvPr>
-        </p:nvSpPr>
-        <p:spPr/>
-        <p:txBody>
-          <a:bodyPr/>
-          <a:lstStyle/>
-          <a:p>
-            <a:fld id="{4CF75428-5BE0-934D-BB71-675F8E23A386}" type="datetime1">
-              <a:rPr lang="en-US" smtClean="0"/>
-              <a:t>3/28/2023</a:t>
-            </a:fld>
-            <a:endParaRPr lang="en-US" dirty="0"/>
-          </a:p>
-        </p:txBody>
-      </p:sp>
-      <p:sp>
-        <p:nvSpPr>
-          <p:cNvPr id="4" name="Footer Placeholder 3">
-            <a:extLst>
-              <a:ext uri="{FF2B5EF4-FFF2-40B4-BE49-F238E27FC236}">
-                <a16:creationId xmlns:a16="http://schemas.microsoft.com/office/drawing/2014/main" id="{6E4EA976-8646-0143-BA18-8675E6FA5EB7}"/>
-              </a:ext>
-            </a:extLst>
-          </p:cNvPr>
-          <p:cNvSpPr>
-            <a:spLocks noGrp="1"/>
-          </p:cNvSpPr>
-          <p:nvPr>
-            <p:ph type="ftr" sz="quarter" idx="11"/>
-          </p:nvPr>
-        </p:nvSpPr>
-        <p:spPr/>
-        <p:txBody>
-          <a:bodyPr/>
-          <a:lstStyle/>
-          <a:p>
-            <a:r>
-              <a:rPr lang="en-US" sz="1200" b="1" i="0" dirty="0" err="1">
-                <a:effectLst/>
-                <a:latin typeface="Arabic Typesetting" panose="020B0604020202020204" pitchFamily="66" charset="-78"/>
-                <a:cs typeface="Arabic Typesetting" panose="020B0604020202020204" pitchFamily="66" charset="-78"/>
-              </a:rPr>
-              <a:t>UnitTests</a:t>
-            </a:r>
-            <a:r>
-              <a:rPr lang="en-US" sz="1200" b="1" i="0" dirty="0">
-                <a:effectLst/>
-                <a:latin typeface="Arabic Typesetting" panose="020B0604020202020204" pitchFamily="66" charset="-78"/>
-                <a:cs typeface="Arabic Typesetting" panose="020B0604020202020204" pitchFamily="66" charset="-78"/>
-              </a:rPr>
-              <a:t> for Temporal Memory Algorithm</a:t>
-            </a:r>
-            <a:endParaRPr lang="en-US" dirty="0"/>
-          </a:p>
-        </p:txBody>
-      </p:sp>
-      <p:sp>
-        <p:nvSpPr>
-          <p:cNvPr id="5" name="Slide Number Placeholder 4">
-            <a:extLst>
-              <a:ext uri="{FF2B5EF4-FFF2-40B4-BE49-F238E27FC236}">
-                <a16:creationId xmlns:a16="http://schemas.microsoft.com/office/drawing/2014/main" id="{7003A5E2-8F37-D546-BCD9-24A2037BB54D}"/>
-              </a:ext>
-            </a:extLst>
-          </p:cNvPr>
-          <p:cNvSpPr>
-            <a:spLocks noGrp="1"/>
-          </p:cNvSpPr>
-          <p:nvPr>
-            <p:ph type="sldNum" sz="quarter" idx="12"/>
-          </p:nvPr>
-        </p:nvSpPr>
-        <p:spPr/>
-        <p:txBody>
-          <a:bodyPr/>
-          <a:lstStyle/>
-          <a:p>
-            <a:fld id="{294A09A9-5501-47C1-A89A-A340965A2BE2}" type="slidenum">
-              <a:rPr lang="en-US" smtClean="0"/>
-              <a:pPr/>
-              <a:t>9</a:t>
-            </a:fld>
             <a:endParaRPr lang="en-US" dirty="0"/>
           </a:p>
         </p:txBody>
@@ -14987,7 +14871,7 @@
     </p:spTree>
     <p:extLst>
       <p:ext uri="{BB962C8B-B14F-4D97-AF65-F5344CB8AC3E}">
-        <p14:creationId xmlns:p14="http://schemas.microsoft.com/office/powerpoint/2010/main" val="2639983765"/>
+        <p14:creationId xmlns:p14="http://schemas.microsoft.com/office/powerpoint/2010/main" val="926184573"/>
       </p:ext>
     </p:extLst>
   </p:cSld>
@@ -15494,6 +15378,15 @@
 </file>
 
 <file path=customXml/item1.xml><?xml version="1.0" encoding="utf-8"?>
+<?mso-contentType ?>
+<FormTemplates xmlns="http://schemas.microsoft.com/sharepoint/v3/contenttype/forms">
+  <Display>DocumentLibraryForm</Display>
+  <Edit>DocumentLibraryForm</Edit>
+  <New>DocumentLibraryForm</New>
+</FormTemplates>
+</file>
+
+<file path=customXml/item2.xml><?xml version="1.0" encoding="utf-8"?>
 <ct:contentTypeSchema xmlns:ct="http://schemas.microsoft.com/office/2006/metadata/contentType" xmlns:ma="http://schemas.microsoft.com/office/2006/metadata/properties/metaAttributes" ct:_="" ma:_="" ma:contentTypeName="Document" ma:contentTypeID="0x01010079F111ED35F8CC479449609E8A0923A6" ma:contentTypeVersion="21" ma:contentTypeDescription="Create a new document." ma:contentTypeScope="" ma:versionID="64dfb1555687e0874b4304b796b5b0c7">
   <xsd:schema xmlns:xsd="http://www.w3.org/2001/XMLSchema" xmlns:xs="http://www.w3.org/2001/XMLSchema" xmlns:p="http://schemas.microsoft.com/office/2006/metadata/properties" xmlns:ns1="http://schemas.microsoft.com/sharepoint/v3" xmlns:ns2="71af3243-3dd4-4a8d-8c0d-dd76da1f02a5" xmlns:ns3="16c05727-aa75-4e4a-9b5f-8a80a1165891" xmlns:ns4="230e9df3-be65-4c73-a93b-d1236ebd677e" targetNamespace="http://schemas.microsoft.com/office/2006/metadata/properties" ma:root="true" ma:fieldsID="e6e4c555b5e194d05b7203de9c4567b3" ns1:_="" ns2:_="" ns3:_="" ns4:_="">
     <xsd:import namespace="http://schemas.microsoft.com/sharepoint/v3"/>
@@ -15775,15 +15668,6 @@
 </ct:contentTypeSchema>
 </file>
 
-<file path=customXml/item2.xml><?xml version="1.0" encoding="utf-8"?>
-<?mso-contentType ?>
-<FormTemplates xmlns="http://schemas.microsoft.com/sharepoint/v3/contenttype/forms">
-  <Display>DocumentLibraryForm</Display>
-  <Edit>DocumentLibraryForm</Edit>
-  <New>DocumentLibraryForm</New>
-</FormTemplates>
-</file>
-
 <file path=customXml/item3.xml><?xml version="1.0" encoding="utf-8"?>
 <p:properties xmlns:p="http://schemas.microsoft.com/office/2006/metadata/properties" xmlns:xsi="http://www.w3.org/2001/XMLSchema-instance" xmlns:pc="http://schemas.microsoft.com/office/infopath/2007/PartnerControls">
   <documentManagement>
@@ -15804,6 +15688,14 @@
 </file>
 
 <file path=customXml/itemProps1.xml><?xml version="1.0" encoding="utf-8"?>
+<ds:datastoreItem xmlns:ds="http://schemas.openxmlformats.org/officeDocument/2006/customXml" ds:itemID="{85334180-0405-413B-834A-44FA9E05ADB7}">
+  <ds:schemaRefs>
+    <ds:schemaRef ds:uri="http://schemas.microsoft.com/sharepoint/v3/contenttype/forms"/>
+  </ds:schemaRefs>
+</ds:datastoreItem>
+</file>
+
+<file path=customXml/itemProps2.xml><?xml version="1.0" encoding="utf-8"?>
 <ds:datastoreItem xmlns:ds="http://schemas.openxmlformats.org/officeDocument/2006/customXml" ds:itemID="{4A615295-94F6-4CE2-A1B1-6B7E1DAA5AD6}">
   <ds:schemaRefs>
     <ds:schemaRef ds:uri="http://schemas.microsoft.com/office/2006/metadata/contentType"/>
@@ -15820,14 +15712,6 @@
     <ds:schemaRef ds:uri="http://purl.org/dc/elements/1.1/"/>
     <ds:schemaRef ds:uri="http://purl.org/dc/terms/"/>
     <ds:schemaRef ds:uri="http://schemas.microsoft.com/internal/obd"/>
-  </ds:schemaRefs>
-</ds:datastoreItem>
-</file>
-
-<file path=customXml/itemProps2.xml><?xml version="1.0" encoding="utf-8"?>
-<ds:datastoreItem xmlns:ds="http://schemas.openxmlformats.org/officeDocument/2006/customXml" ds:itemID="{85334180-0405-413B-834A-44FA9E05ADB7}">
-  <ds:schemaRefs>
-    <ds:schemaRef ds:uri="http://schemas.microsoft.com/sharepoint/v3/contenttype/forms"/>
   </ds:schemaRefs>
 </ds:datastoreItem>
 </file>

</xml_diff>